<commit_message>
update ppt & add hashmap test code
</commit_message>
<xml_diff>
--- a/vitess/MySQL Index & Orchestrator.pptx
+++ b/vitess/MySQL Index & Orchestrator.pptx
@@ -242,7 +242,7 @@
           <a:p>
             <a:fld id="{4BD4AD5A-3C79-4C81-81A6-615F3C28CB68}" type="datetimeFigureOut">
               <a:rPr lang="zh-CN" altLang="en-US" smtClean="0"/>
-              <a:t>2018-08-14</a:t>
+              <a:t>2018/8/15</a:t>
             </a:fld>
             <a:endParaRPr lang="zh-CN" altLang="en-US"/>
           </a:p>
@@ -408,7 +408,7 @@
           <a:p>
             <a:fld id="{ECB65501-F968-4A9F-99EE-A10D6BC145F0}" type="datetimeFigureOut">
               <a:rPr lang="zh-CN" altLang="en-US" smtClean="0"/>
-              <a:t>2018-08-14</a:t>
+              <a:t>2018/8/15</a:t>
             </a:fld>
             <a:endParaRPr lang="zh-CN" altLang="en-US"/>
           </a:p>
@@ -10121,6 +10121,13 @@
   <p:clrMapOvr>
     <a:masterClrMapping/>
   </p:clrMapOvr>
+  <p:timing>
+    <p:tnLst>
+      <p:par>
+        <p:cTn id="1" dur="indefinite" restart="never" nodeType="tmRoot"/>
+      </p:par>
+    </p:tnLst>
+  </p:timing>
 </p:sld>
 </file>
 
@@ -11444,6 +11451,13 @@
   <p:clrMapOvr>
     <a:masterClrMapping/>
   </p:clrMapOvr>
+  <p:timing>
+    <p:tnLst>
+      <p:par>
+        <p:cTn id="1" dur="indefinite" restart="never" nodeType="tmRoot"/>
+      </p:par>
+    </p:tnLst>
+  </p:timing>
 </p:sld>
 </file>
 
@@ -12910,8 +12924,17 @@
             </a:r>
             <a:r>
               <a:rPr lang="en-US" altLang="zh-CN" sz="1200" dirty="0"/>
-              <a:t> -h 127.0.0.1 -P6032 --prompt='Admin&gt; ‘</a:t>
-            </a:r>
+              <a:t> -h 127.0.0.1 -P6032 --</a:t>
+            </a:r>
+            <a:r>
+              <a:rPr lang="en-US" altLang="zh-CN" sz="1200" dirty="0" smtClean="0"/>
+              <a:t>prompt=‘Admin&gt;</a:t>
+            </a:r>
+            <a:r>
+              <a:rPr lang="en-US" altLang="zh-CN" sz="1200" dirty="0" smtClean="0"/>
+              <a:t>’</a:t>
+            </a:r>
+            <a:endParaRPr lang="en-US" altLang="zh-CN" sz="1200" dirty="0"/>
           </a:p>
           <a:p>
             <a:pPr marL="0" indent="0">
@@ -13162,7 +13185,15 @@
           <a:p>
             <a:r>
               <a:rPr lang="en-US" altLang="zh-CN" dirty="0"/>
-              <a:t>Other types of index</a:t>
+              <a:t>Other types </a:t>
+            </a:r>
+            <a:r>
+              <a:rPr lang="en-US" altLang="zh-CN"/>
+              <a:t>of </a:t>
+            </a:r>
+            <a:r>
+              <a:rPr lang="en-US" altLang="zh-CN" smtClean="0"/>
+              <a:t>index</a:t>
             </a:r>
             <a:endParaRPr lang="zh-CN" altLang="en-US" dirty="0"/>
           </a:p>

</xml_diff>